<commit_message>
stairs and day 53
</commit_message>
<xml_diff>
--- a/2nd Semester/MathAnalysis_Day_053 Work Day Project (Day 3).pptx
+++ b/2nd Semester/MathAnalysis_Day_053 Work Day Project (Day 3).pptx
@@ -204,7 +204,7 @@
           <a:p>
             <a:fld id="{0090E0ED-51A2-4D0E-BDCF-E17571396CEC}" type="datetimeFigureOut">
               <a:rPr lang="en-US" smtClean="0"/>
-              <a:t>2/13/2018</a:t>
+              <a:t>2/14/2018</a:t>
             </a:fld>
             <a:endParaRPr lang="en-US"/>
           </a:p>
@@ -457,7 +457,7 @@
             <a:fld id="{87DE6118-2437-4B30-8E3C-4D2BE6020583}" type="datetimeFigureOut">
               <a:rPr lang="en-US" dirty="0"/>
               <a:pPr/>
-              <a:t>2/13/2018</a:t>
+              <a:t>2/14/2018</a:t>
             </a:fld>
             <a:endParaRPr lang="en-US" dirty="0"/>
           </a:p>
@@ -783,7 +783,7 @@
           <a:p>
             <a:fld id="{87DE6118-2437-4B30-8E3C-4D2BE6020583}" type="datetimeFigureOut">
               <a:rPr lang="en-US" dirty="0"/>
-              <a:t>2/13/2018</a:t>
+              <a:t>2/14/2018</a:t>
             </a:fld>
             <a:endParaRPr lang="en-US" dirty="0"/>
           </a:p>
@@ -958,7 +958,7 @@
           <a:p>
             <a:fld id="{87DE6118-2437-4B30-8E3C-4D2BE6020583}" type="datetimeFigureOut">
               <a:rPr lang="en-US" dirty="0"/>
-              <a:t>2/13/2018</a:t>
+              <a:t>2/14/2018</a:t>
             </a:fld>
             <a:endParaRPr lang="en-US" dirty="0"/>
           </a:p>
@@ -1123,7 +1123,7 @@
           <a:p>
             <a:fld id="{87DE6118-2437-4B30-8E3C-4D2BE6020583}" type="datetimeFigureOut">
               <a:rPr lang="en-US" dirty="0"/>
-              <a:t>2/13/2018</a:t>
+              <a:t>2/14/2018</a:t>
             </a:fld>
             <a:endParaRPr lang="en-US" dirty="0"/>
           </a:p>
@@ -1396,7 +1396,7 @@
             <a:fld id="{87DE6118-2437-4B30-8E3C-4D2BE6020583}" type="datetimeFigureOut">
               <a:rPr lang="en-US" dirty="0"/>
               <a:pPr/>
-              <a:t>2/13/2018</a:t>
+              <a:t>2/14/2018</a:t>
             </a:fld>
             <a:endParaRPr lang="en-US" dirty="0"/>
           </a:p>
@@ -1786,7 +1786,7 @@
           <a:p>
             <a:fld id="{87DE6118-2437-4B30-8E3C-4D2BE6020583}" type="datetimeFigureOut">
               <a:rPr lang="en-US" dirty="0"/>
-              <a:t>2/13/2018</a:t>
+              <a:t>2/14/2018</a:t>
             </a:fld>
             <a:endParaRPr lang="en-US" dirty="0"/>
           </a:p>
@@ -2258,7 +2258,7 @@
           <a:p>
             <a:fld id="{87DE6118-2437-4B30-8E3C-4D2BE6020583}" type="datetimeFigureOut">
               <a:rPr lang="en-US" dirty="0"/>
-              <a:t>2/13/2018</a:t>
+              <a:t>2/14/2018</a:t>
             </a:fld>
             <a:endParaRPr lang="en-US" dirty="0"/>
           </a:p>
@@ -2371,7 +2371,7 @@
           <a:p>
             <a:fld id="{87DE6118-2437-4B30-8E3C-4D2BE6020583}" type="datetimeFigureOut">
               <a:rPr lang="en-US" dirty="0"/>
-              <a:t>2/13/2018</a:t>
+              <a:t>2/14/2018</a:t>
             </a:fld>
             <a:endParaRPr lang="en-US" dirty="0"/>
           </a:p>
@@ -2461,7 +2461,7 @@
           <a:p>
             <a:fld id="{87DE6118-2437-4B30-8E3C-4D2BE6020583}" type="datetimeFigureOut">
               <a:rPr lang="en-US" dirty="0"/>
-              <a:t>2/13/2018</a:t>
+              <a:t>2/14/2018</a:t>
             </a:fld>
             <a:endParaRPr lang="en-US" dirty="0"/>
           </a:p>
@@ -2803,7 +2803,7 @@
             <a:fld id="{87DE6118-2437-4B30-8E3C-4D2BE6020583}" type="datetimeFigureOut">
               <a:rPr lang="en-US" dirty="0"/>
               <a:pPr/>
-              <a:t>2/13/2018</a:t>
+              <a:t>2/14/2018</a:t>
             </a:fld>
             <a:endParaRPr lang="en-US" dirty="0"/>
           </a:p>
@@ -3188,7 +3188,7 @@
             <a:fld id="{87DE6118-2437-4B30-8E3C-4D2BE6020583}" type="datetimeFigureOut">
               <a:rPr lang="en-US" dirty="0"/>
               <a:pPr/>
-              <a:t>2/13/2018</a:t>
+              <a:t>2/14/2018</a:t>
             </a:fld>
             <a:endParaRPr lang="en-US" dirty="0"/>
           </a:p>
@@ -3463,7 +3463,7 @@
             <a:fld id="{87DE6118-2437-4B30-8E3C-4D2BE6020583}" type="datetimeFigureOut">
               <a:rPr lang="en-US" dirty="0"/>
               <a:pPr/>
-              <a:t>2/13/2018</a:t>
+              <a:t>2/14/2018</a:t>
             </a:fld>
             <a:endParaRPr lang="en-US" dirty="0"/>
           </a:p>
@@ -4011,11 +4011,7 @@
           <a:p>
             <a:r>
               <a:rPr lang="en-US" dirty="0" smtClean="0"/>
-              <a:t>Day </a:t>
-            </a:r>
-            <a:r>
-              <a:rPr lang="en-US" dirty="0" smtClean="0"/>
-              <a:t>53</a:t>
+              <a:t>Day 53</a:t>
             </a:r>
             <a:endParaRPr lang="en-US" dirty="0"/>
           </a:p>
@@ -4710,6 +4706,13 @@
   <p:clrMapOvr>
     <a:masterClrMapping/>
   </p:clrMapOvr>
+  <p:timing>
+    <p:tnLst>
+      <p:par>
+        <p:cTn id="1" dur="indefinite" restart="never" nodeType="tmRoot"/>
+      </p:par>
+    </p:tnLst>
+  </p:timing>
 </p:sld>
 </file>
 
@@ -4755,11 +4758,7 @@
             </a:r>
             <a:r>
               <a:rPr lang="en-US" dirty="0" smtClean="0"/>
-              <a:t>”… Must </a:t>
-            </a:r>
-            <a:r>
-              <a:rPr lang="en-US" dirty="0" smtClean="0"/>
-              <a:t>Haves! </a:t>
+              <a:t>”… Must Haves! </a:t>
             </a:r>
             <a:br>
               <a:rPr lang="en-US" dirty="0" smtClean="0"/>
@@ -4817,7 +4816,6 @@
               <a:rPr lang="en-US" sz="3400" b="1" dirty="0" smtClean="0"/>
               <a:t>	</a:t>
             </a:r>
-            <a:endParaRPr lang="en-US" sz="3400" b="1" dirty="0" smtClean="0"/>
           </a:p>
           <a:p>
             <a:pPr marL="530352" lvl="1" indent="0">
@@ -5084,8 +5082,12 @@
               <a:rPr lang="en-US" dirty="0" smtClean="0"/>
             </a:br>
             <a:r>
+              <a:rPr lang="en-US" sz="4000" b="1" i="1" smtClean="0"/>
+              <a:t>[Summative Assessment</a:t>
+            </a:r>
+            <a:r>
               <a:rPr lang="en-US" sz="4000" b="1" i="1" dirty="0" smtClean="0"/>
-              <a:t>[Formative Assessment]</a:t>
+              <a:t>]</a:t>
             </a:r>
             <a:endParaRPr lang="en-US" sz="4000" b="1" dirty="0"/>
           </a:p>
@@ -5117,30 +5119,56 @@
               <a:rPr lang="en-US" sz="3400" dirty="0" smtClean="0"/>
               <a:t>I’ll be checking in Trello so you’ll have full time to work. </a:t>
             </a:r>
+          </a:p>
+          <a:p>
+            <a:r>
+              <a:rPr lang="en-US" sz="3400" dirty="0" smtClean="0"/>
+              <a:t>I need to see </a:t>
+            </a:r>
+            <a:r>
+              <a:rPr lang="en-US" sz="3400" b="1" u="sng" dirty="0" smtClean="0"/>
+              <a:t>roles</a:t>
+            </a:r>
+            <a:r>
+              <a:rPr lang="en-US" sz="3400" dirty="0" smtClean="0"/>
+              <a:t>, and </a:t>
+            </a:r>
+            <a:r>
+              <a:rPr lang="en-US" sz="3400" b="1" u="sng" dirty="0" smtClean="0"/>
+              <a:t>deadlines</a:t>
+            </a:r>
+            <a:r>
+              <a:rPr lang="en-US" sz="3400" dirty="0" smtClean="0"/>
+              <a:t> for the 10 weeks. </a:t>
+            </a:r>
+            <a:endParaRPr lang="en-US" sz="3400" dirty="0"/>
+          </a:p>
+          <a:p>
+            <a:r>
+              <a:rPr lang="en-US" sz="3400" dirty="0" smtClean="0"/>
+              <a:t>This weeks Daily Logs </a:t>
+            </a:r>
+            <a:r>
+              <a:rPr lang="en-US" sz="3400" dirty="0" smtClean="0"/>
+              <a:t>posted in </a:t>
+            </a:r>
+            <a:r>
+              <a:rPr lang="en-US" sz="3400" dirty="0" smtClean="0"/>
+              <a:t>TEAMS (formal write up next week).</a:t>
+            </a:r>
             <a:endParaRPr lang="en-US" sz="3400" dirty="0" smtClean="0"/>
           </a:p>
           <a:p>
             <a:r>
               <a:rPr lang="en-US" sz="3400" dirty="0" smtClean="0"/>
-              <a:t>I need to see roles, and deadlines for the 10 weeks. </a:t>
-            </a:r>
-            <a:endParaRPr lang="en-US" sz="3400" dirty="0"/>
+              <a:t>Specific goals for over this long weekend, and when you return to class next week. </a:t>
+            </a:r>
+            <a:endParaRPr lang="en-US" sz="3400" dirty="0" smtClean="0"/>
           </a:p>
           <a:p>
             <a:r>
               <a:rPr lang="en-US" sz="3400" dirty="0" smtClean="0"/>
-              <a:t>Daily Log posted in TEAMS.</a:t>
-            </a:r>
-            <a:endParaRPr lang="en-US" sz="3400" dirty="0" smtClean="0"/>
-          </a:p>
-          <a:p>
-            <a:r>
-              <a:rPr lang="en-US" sz="3400" dirty="0" smtClean="0"/>
-              <a:t>Specific </a:t>
-            </a:r>
-            <a:r>
-              <a:rPr lang="en-US" sz="3400" dirty="0" smtClean="0"/>
-              <a:t>goals for over this long weekend, and when you return to class next week. </a:t>
+              <a:t>Post your code on TEAMS</a:t>
             </a:r>
             <a:endParaRPr lang="en-US" sz="3400" dirty="0"/>
           </a:p>

</xml_diff>